<commit_message>
Cập nhật thành viên và tạo DOD
</commit_message>
<xml_diff>
--- a/Documents/Tuan2/Nhom_3_Tuan_2.pptx
+++ b/Documents/Tuan2/Nhom_3_Tuan_2.pptx
@@ -411,7 +411,7 @@
           <a:p>
             <a:fld id="{9184DA70-C731-4C70-880D-CCD4705E623C}" type="datetime1">
               <a:rPr lang="en-US" smtClean="0"/>
-              <a:t>11/16/2019</a:t>
+              <a:t>11/30/2019</a:t>
             </a:fld>
             <a:endParaRPr lang="en-US" dirty="0"/>
           </a:p>
@@ -599,7 +599,7 @@
           <a:p>
             <a:fld id="{B612A279-0833-481D-8C56-F67FD0AC6C50}" type="datetime1">
               <a:rPr lang="en-US" smtClean="0"/>
-              <a:t>11/16/2019</a:t>
+              <a:t>11/30/2019</a:t>
             </a:fld>
             <a:endParaRPr lang="en-US" dirty="0"/>
           </a:p>
@@ -841,7 +841,7 @@
           <a:p>
             <a:fld id="{6587DA83-5663-4C9C-B9AA-0B40A3DAFF81}" type="datetime1">
               <a:rPr lang="en-US" smtClean="0"/>
-              <a:t>11/16/2019</a:t>
+              <a:t>11/30/2019</a:t>
             </a:fld>
             <a:endParaRPr lang="en-US" dirty="0"/>
           </a:p>
@@ -1029,7 +1029,7 @@
           <a:p>
             <a:fld id="{4BE1D723-8F53-4F53-90B0-1982A396982E}" type="datetime1">
               <a:rPr lang="en-US" smtClean="0"/>
-              <a:t>11/16/2019</a:t>
+              <a:t>11/30/2019</a:t>
             </a:fld>
             <a:endParaRPr lang="en-US" dirty="0"/>
           </a:p>
@@ -1402,7 +1402,7 @@
           <a:p>
             <a:fld id="{97669AF7-7BEB-44E4-9852-375E34362B5B}" type="datetime1">
               <a:rPr lang="en-US" smtClean="0"/>
-              <a:t>11/16/2019</a:t>
+              <a:t>11/30/2019</a:t>
             </a:fld>
             <a:endParaRPr lang="en-US" dirty="0"/>
           </a:p>
@@ -1657,7 +1657,7 @@
           <a:p>
             <a:fld id="{BAAAC38D-0552-4C82-B593-E6124DFADBE2}" type="datetime1">
               <a:rPr lang="en-US" smtClean="0"/>
-              <a:t>11/16/2019</a:t>
+              <a:t>11/30/2019</a:t>
             </a:fld>
             <a:endParaRPr lang="en-US" dirty="0"/>
           </a:p>
@@ -2054,7 +2054,7 @@
           <a:p>
             <a:fld id="{D9DF0F1C-5577-4ACB-BB62-DF8F3C494C7E}" type="datetime1">
               <a:rPr lang="en-US" smtClean="0"/>
-              <a:t>11/16/2019</a:t>
+              <a:t>11/30/2019</a:t>
             </a:fld>
             <a:endParaRPr lang="en-US" dirty="0"/>
           </a:p>
@@ -2190,7 +2190,7 @@
           <a:p>
             <a:fld id="{1775B394-D9F9-4F0C-B15D-605F45CB9E9F}" type="datetime1">
               <a:rPr lang="en-US" smtClean="0"/>
-              <a:t>11/16/2019</a:t>
+              <a:t>11/30/2019</a:t>
             </a:fld>
             <a:endParaRPr lang="en-US" dirty="0"/>
           </a:p>
@@ -2347,7 +2347,7 @@
           <a:p>
             <a:fld id="{39667345-2558-425A-8533-9BFDBCE15005}" type="datetime1">
               <a:rPr lang="en-US" smtClean="0"/>
-              <a:t>11/16/2019</a:t>
+              <a:t>11/30/2019</a:t>
             </a:fld>
             <a:endParaRPr lang="en-US" dirty="0"/>
           </a:p>
@@ -2676,7 +2676,7 @@
           <a:p>
             <a:fld id="{92BEA474-078D-4E9B-9B14-09A87B19DC46}" type="datetime1">
               <a:rPr lang="en-US" smtClean="0"/>
-              <a:t>11/16/2019</a:t>
+              <a:t>11/30/2019</a:t>
             </a:fld>
             <a:endParaRPr lang="en-US" dirty="0"/>
           </a:p>
@@ -3026,7 +3026,7 @@
           <a:p>
             <a:fld id="{4907D986-8816-4272-A432-0437A28A9828}" type="datetime1">
               <a:rPr lang="en-US" smtClean="0"/>
-              <a:t>11/16/2019</a:t>
+              <a:t>11/30/2019</a:t>
             </a:fld>
             <a:endParaRPr lang="en-US" dirty="0"/>
           </a:p>
@@ -3287,7 +3287,7 @@
           <a:p>
             <a:fld id="{62D6E202-B606-4609-B914-27C9371A1F6D}" type="datetime1">
               <a:rPr lang="en-US" smtClean="0"/>
-              <a:t>11/16/2019</a:t>
+              <a:t>11/30/2019</a:t>
             </a:fld>
             <a:endParaRPr lang="en-US" dirty="0"/>
           </a:p>
@@ -3826,7 +3826,7 @@
                 <a16:creationId xmlns:a16="http://schemas.microsoft.com/office/drawing/2014/main" id="{A9286AD2-18A9-4868-A4E3-7A2097A20810}"/>
               </a:ext>
               <a:ext uri="{C183D7F6-B498-43B3-948B-1728B52AA6E4}">
-                <adec:decorative xmlns:adec="http://schemas.microsoft.com/office/drawing/2017/decorative" xmlns="" val="1"/>
+                <adec:decorative xmlns="" xmlns:adec="http://schemas.microsoft.com/office/drawing/2017/decorative" val="1"/>
               </a:ext>
             </a:extLst>
           </p:cNvPr>
@@ -4198,7 +4198,7 @@
                 <a16:creationId xmlns:a16="http://schemas.microsoft.com/office/drawing/2014/main" id="{E7A7CD63-7EC3-44F3-95D0-595C4019FF24}"/>
               </a:ext>
               <a:ext uri="{C183D7F6-B498-43B3-948B-1728B52AA6E4}">
-                <adec:decorative xmlns:adec="http://schemas.microsoft.com/office/drawing/2017/decorative" xmlns="" val="1"/>
+                <adec:decorative xmlns="" xmlns:adec="http://schemas.microsoft.com/office/drawing/2017/decorative" val="1"/>
               </a:ext>
             </a:extLst>
           </p:cNvPr>
@@ -6034,7 +6034,7 @@
                 <a16:creationId xmlns:a16="http://schemas.microsoft.com/office/drawing/2014/main" id="{F64BBAA4-C62B-4146-B49F-FE4CC4655EE0}"/>
               </a:ext>
               <a:ext uri="{C183D7F6-B498-43B3-948B-1728B52AA6E4}">
-                <adec:decorative xmlns:adec="http://schemas.microsoft.com/office/drawing/2017/decorative" xmlns="" val="1"/>
+                <adec:decorative xmlns="" xmlns:adec="http://schemas.microsoft.com/office/drawing/2017/decorative" val="1"/>
               </a:ext>
             </a:extLst>
           </p:cNvPr>
@@ -6132,7 +6132,7 @@
                 <a16:creationId xmlns:a16="http://schemas.microsoft.com/office/drawing/2014/main" id="{EEB57AA8-F021-480C-A9E2-F89913313611}"/>
               </a:ext>
               <a:ext uri="{C183D7F6-B498-43B3-948B-1728B52AA6E4}">
-                <adec:decorative xmlns:adec="http://schemas.microsoft.com/office/drawing/2017/decorative" xmlns="" val="1"/>
+                <adec:decorative xmlns="" xmlns:adec="http://schemas.microsoft.com/office/drawing/2017/decorative" val="1"/>
               </a:ext>
             </a:extLst>
           </p:cNvPr>
@@ -6219,7 +6219,7 @@
                 <a16:creationId xmlns:a16="http://schemas.microsoft.com/office/drawing/2014/main" id="{75CF30C0-9394-4459-976E-2AA223FB125F}"/>
               </a:ext>
               <a:ext uri="{C183D7F6-B498-43B3-948B-1728B52AA6E4}">
-                <adec:decorative xmlns:adec="http://schemas.microsoft.com/office/drawing/2017/decorative" xmlns="" val="1"/>
+                <adec:decorative xmlns="" xmlns:adec="http://schemas.microsoft.com/office/drawing/2017/decorative" val="1"/>
               </a:ext>
             </a:extLst>
           </p:cNvPr>
@@ -6281,14 +6281,14 @@
           <p:nvPr>
             <p:extLst>
               <p:ext uri="{D42A27DB-BD31-4B8C-83A1-F6EECF244321}">
-                <p14:modId xmlns:p14="http://schemas.microsoft.com/office/powerpoint/2010/main" val="119163768"/>
+                <p14:modId xmlns:p14="http://schemas.microsoft.com/office/powerpoint/2010/main" val="3551742504"/>
               </p:ext>
             </p:extLst>
           </p:nvPr>
         </p:nvGraphicFramePr>
         <p:xfrm>
           <a:off x="4653447" y="805561"/>
-          <a:ext cx="6892560" cy="4908056"/>
+          <a:ext cx="6892560" cy="4309780"/>
         </p:xfrm>
         <a:graphic>
           <a:graphicData uri="http://schemas.openxmlformats.org/drawingml/2006/table">
@@ -6605,7 +6605,7 @@
                         </a:spcAft>
                       </a:pPr>
                       <a:r>
-                        <a:rPr lang="vi-VN" sz="1800">
+                        <a:rPr lang="vi-VN" sz="1800" dirty="0">
                           <a:solidFill>
                             <a:schemeClr val="tx1">
                               <a:lumMod val="75000"/>
@@ -6615,9 +6615,9 @@
                           <a:effectLst/>
                           <a:latin typeface="+mj-lt"/>
                         </a:rPr>
-                        <a:t>18424036</a:t>
+                        <a:t>18424038</a:t>
                       </a:r>
-                      <a:endParaRPr lang="en-US" sz="1800">
+                      <a:endParaRPr lang="en-US" sz="1800" dirty="0">
                         <a:solidFill>
                           <a:schemeClr val="tx1">
                             <a:lumMod val="75000"/>
@@ -6644,145 +6644,9 @@
                         <a:srgbClr val="C7C6C1"/>
                       </a:solidFill>
                       <a:prstDash val="solid"/>
-                    </a:lnT>
-                    <a:lnB w="9525" cap="flat" cmpd="sng" algn="ctr">
-                      <a:solidFill>
-                        <a:srgbClr val="C7C6C1"/>
-                      </a:solidFill>
-                      <a:prstDash val="solid"/>
-                    </a:lnB>
-                    <a:noFill/>
-                  </a:tcPr>
-                </a:tc>
-                <a:tc>
-                  <a:txBody>
-                    <a:bodyPr/>
-                    <a:lstStyle/>
-                    <a:p>
-                      <a:pPr marL="0" marR="0">
-                        <a:lnSpc>
-                          <a:spcPct val="115000"/>
-                        </a:lnSpc>
-                        <a:spcBef>
-                          <a:spcPts val="0"/>
-                        </a:spcBef>
-                        <a:spcAft>
-                          <a:spcPts val="0"/>
-                        </a:spcAft>
-                      </a:pPr>
-                      <a:r>
-                        <a:rPr lang="vi-VN" sz="1800">
-                          <a:solidFill>
-                            <a:schemeClr val="tx1">
-                              <a:lumMod val="75000"/>
-                              <a:lumOff val="25000"/>
-                            </a:schemeClr>
-                          </a:solidFill>
-                          <a:effectLst/>
-                          <a:latin typeface="+mj-lt"/>
-                        </a:rPr>
-                        <a:t>Đỗ Đăng Khoa</a:t>
-                      </a:r>
-                      <a:endParaRPr lang="en-US" sz="1800">
-                        <a:solidFill>
-                          <a:schemeClr val="tx1">
-                            <a:lumMod val="75000"/>
-                            <a:lumOff val="25000"/>
-                          </a:schemeClr>
-                        </a:solidFill>
-                        <a:effectLst/>
-                        <a:latin typeface="+mj-lt"/>
-                        <a:ea typeface="Arial" panose="020B0604020202020204" pitchFamily="34" charset="0"/>
-                      </a:endParaRPr>
-                    </a:p>
-                  </a:txBody>
-                  <a:tcPr marL="264449" marR="198336" marT="132224" marB="132224">
-                    <a:lnL w="12700" cmpd="sng">
-                      <a:noFill/>
-                      <a:prstDash val="solid"/>
-                    </a:lnL>
-                    <a:lnR w="12700" cmpd="sng">
-                      <a:noFill/>
-                      <a:prstDash val="solid"/>
-                    </a:lnR>
-                    <a:lnT w="9525" cap="flat" cmpd="sng" algn="ctr">
-                      <a:solidFill>
-                        <a:srgbClr val="C7C6C1"/>
-                      </a:solidFill>
-                      <a:prstDash val="solid"/>
-                    </a:lnT>
-                    <a:lnB w="9525" cap="flat" cmpd="sng" algn="ctr">
-                      <a:solidFill>
-                        <a:srgbClr val="C7C6C1"/>
-                      </a:solidFill>
-                      <a:prstDash val="solid"/>
-                    </a:lnB>
-                    <a:noFill/>
-                  </a:tcPr>
-                </a:tc>
-                <a:extLst>
-                  <a:ext uri="{0D108BD9-81ED-4DB2-BD59-A6C34878D82A}">
-                    <a16:rowId xmlns:a16="http://schemas.microsoft.com/office/drawing/2014/main" val="105779935"/>
-                  </a:ext>
-                </a:extLst>
-              </a:tr>
-              <a:tr h="598276">
-                <a:tc>
-                  <a:txBody>
-                    <a:bodyPr/>
-                    <a:lstStyle/>
-                    <a:p>
-                      <a:pPr marL="0" marR="0">
-                        <a:lnSpc>
-                          <a:spcPct val="115000"/>
-                        </a:lnSpc>
-                        <a:spcBef>
-                          <a:spcPts val="0"/>
-                        </a:spcBef>
-                        <a:spcAft>
-                          <a:spcPts val="0"/>
-                        </a:spcAft>
-                      </a:pPr>
-                      <a:r>
-                        <a:rPr lang="vi-VN" sz="1800">
-                          <a:solidFill>
-                            <a:schemeClr val="tx1">
-                              <a:lumMod val="75000"/>
-                              <a:lumOff val="25000"/>
-                            </a:schemeClr>
-                          </a:solidFill>
-                          <a:effectLst/>
-                          <a:latin typeface="+mj-lt"/>
-                        </a:rPr>
-                        <a:t>18424038</a:t>
-                      </a:r>
-                      <a:endParaRPr lang="en-US" sz="1800">
-                        <a:solidFill>
-                          <a:schemeClr val="tx1">
-                            <a:lumMod val="75000"/>
-                            <a:lumOff val="25000"/>
-                          </a:schemeClr>
-                        </a:solidFill>
-                        <a:effectLst/>
-                        <a:latin typeface="+mj-lt"/>
-                        <a:ea typeface="Arial" panose="020B0604020202020204" pitchFamily="34" charset="0"/>
-                      </a:endParaRPr>
-                    </a:p>
-                  </a:txBody>
-                  <a:tcPr marL="264449" marR="198336" marT="132224" marB="132224">
-                    <a:lnL w="12700" cmpd="sng">
-                      <a:noFill/>
-                      <a:prstDash val="solid"/>
-                    </a:lnL>
-                    <a:lnR w="12700" cmpd="sng">
-                      <a:noFill/>
-                      <a:prstDash val="solid"/>
-                    </a:lnR>
-                    <a:lnT w="9525" cap="flat" cmpd="sng" algn="ctr">
-                      <a:solidFill>
-                        <a:srgbClr val="C7C6C1"/>
-                      </a:solidFill>
-                      <a:prstDash val="solid"/>
+                      <a:round/>
+                      <a:headEnd type="none" w="med" len="med"/>
+                      <a:tailEnd type="none" w="med" len="med"/>
                     </a:lnT>
                     <a:lnB w="9525" cap="flat" cmpd="sng" algn="ctr">
                       <a:solidFill>
@@ -6849,6 +6713,9 @@
                         <a:srgbClr val="C7C6C1"/>
                       </a:solidFill>
                       <a:prstDash val="solid"/>
+                      <a:round/>
+                      <a:headEnd type="none" w="med" len="med"/>
+                      <a:tailEnd type="none" w="med" len="med"/>
                     </a:lnT>
                     <a:lnB w="9525" cap="flat" cmpd="sng" algn="ctr">
                       <a:solidFill>
@@ -13489,6 +13356,8 @@
             </a:r>
             <a:r>
               <a:rPr lang="en-US" sz="2000" dirty="0">
+                <a:latin typeface="Times New Roman" panose="02020603050405020304" pitchFamily="18" charset="0"/>
+                <a:cs typeface="Times New Roman" panose="02020603050405020304" pitchFamily="18" charset="0"/>
                 <a:hlinkClick r:id="rId2"/>
               </a:rPr>
               <a:t>https://www.smartsheet.com/free-work-breakdown-structure-templates</a:t>
@@ -13777,10 +13646,6 @@
               </a:rPr>
               <a:t>học</a:t>
             </a:r>
-            <a:endParaRPr lang="en-US" sz="1800" dirty="0" smtClean="0">
-              <a:latin typeface="Times New Roman" panose="02020603050405020304" pitchFamily="18" charset="0"/>
-              <a:cs typeface="Times New Roman" panose="02020603050405020304" pitchFamily="18" charset="0"/>
-            </a:endParaRPr>
           </a:p>
           <a:p>
             <a:pPr lvl="1"/>
@@ -19072,10 +18937,6 @@
               </a:rPr>
               <a:t>Marketing: ~ 1.000.000VNĐ</a:t>
             </a:r>
-            <a:endParaRPr lang="en-US" sz="1600" dirty="0" smtClean="0">
-              <a:latin typeface="Times New Roman" panose="02020603050405020304" pitchFamily="18" charset="0"/>
-              <a:cs typeface="Times New Roman" panose="02020603050405020304" pitchFamily="18" charset="0"/>
-            </a:endParaRPr>
           </a:p>
           <a:p>
             <a:pPr lvl="2">
@@ -33045,7 +32906,28 @@
                 <a:latin typeface="Times New Roman" panose="02020603050405020304" pitchFamily="18" charset="0"/>
                 <a:cs typeface="Times New Roman" panose="02020603050405020304" pitchFamily="18" charset="0"/>
               </a:rPr>
-              <a:t>Nếu đi học thì mất rất nhiều thời gian đi lai và tiền để đi học tại các trung tâm</a:t>
+              <a:t>Nếu đi học thì mất rất nhiều thời gian đi </a:t>
+            </a:r>
+            <a:r>
+              <a:rPr lang="en-US" sz="2400" dirty="0" smtClean="0">
+                <a:latin typeface="Times New Roman" panose="02020603050405020304" pitchFamily="18" charset="0"/>
+                <a:cs typeface="Times New Roman" panose="02020603050405020304" pitchFamily="18" charset="0"/>
+              </a:rPr>
+              <a:t>lạ</a:t>
+            </a:r>
+            <a:r>
+              <a:rPr lang="en-US" sz="2400" dirty="0" smtClean="0">
+                <a:latin typeface="Times New Roman" panose="02020603050405020304" pitchFamily="18" charset="0"/>
+                <a:cs typeface="Times New Roman" panose="02020603050405020304" pitchFamily="18" charset="0"/>
+              </a:rPr>
+              <a:t>i </a:t>
+            </a:r>
+            <a:r>
+              <a:rPr lang="en-US" sz="2400" dirty="0">
+                <a:latin typeface="Times New Roman" panose="02020603050405020304" pitchFamily="18" charset="0"/>
+                <a:cs typeface="Times New Roman" panose="02020603050405020304" pitchFamily="18" charset="0"/>
+              </a:rPr>
+              <a:t>và tiền để đi học tại các trung tâm</a:t>
             </a:r>
           </a:p>
           <a:p>
@@ -35329,7 +35211,7 @@
         <p:spPr>
           <a:xfrm>
             <a:off x="1097279" y="2108201"/>
-            <a:ext cx="4066391" cy="3760891"/>
+            <a:ext cx="10058401" cy="3760891"/>
           </a:xfrm>
         </p:spPr>
         <p:txBody>

</xml_diff>